<commit_message>
remove password protection on pptx files
</commit_message>
<xml_diff>
--- a/lesson_nav/Statistical-Inference/Chapter-1/Section-1-1/Presentation-1-1-1-Sample-Space-and-Events.pptx
+++ b/lesson_nav/Statistical-Inference/Chapter-1/Section-1-1/Presentation-1-1-1-Sample-Space-and-Events.pptx
@@ -117,7 +117,6 @@
       </a:defRPr>
     </a:lvl9pPr>
   </p:defaultTextStyle>
-  <p:modifyVerifier cryptProviderType="rsaAES" cryptAlgorithmClass="hash" cryptAlgorithmType="typeAny" cryptAlgorithmSid="14" spinCount="100000" saltData="1YL05p+oy4iacEqjTHTZJw==" hashData="XJ5B7Wy0vvUgWD/HLIQL4ntcGTp4NqUmU0sQPZc1K7MIVmcdLMLGjw6HTHA0AbBLE2LHDO6YsOI/s8FEKPqhPg=="/>
   <p:extLst>
     <p:ext uri="{EFAFB233-063F-42B5-8137-9DF3F51BA10A}">
       <p15:sldGuideLst xmlns:p15="http://schemas.microsoft.com/office/powerpoint/2012/main"/>
@@ -208,7 +207,7 @@
           <a:p>
             <a:fld id="{9418EEB3-6E95-4294-BCBD-343443EE35B9}" type="datetimeFigureOut">
               <a:rPr lang="en-US" smtClean="0"/>
-              <a:t>2/23/2020</a:t>
+              <a:t>2/29/2020</a:t>
             </a:fld>
             <a:endParaRPr lang="en-US"/>
           </a:p>
@@ -1440,7 +1439,7 @@
           <a:p>
             <a:fld id="{0576FAC3-2C94-421C-A7C5-3B8E37D04DF2}" type="datetime1">
               <a:rPr lang="en-US" smtClean="0"/>
-              <a:t>2/23/2020</a:t>
+              <a:t>2/29/2020</a:t>
             </a:fld>
             <a:endParaRPr lang="en-US"/>
           </a:p>
@@ -1743,7 +1742,7 @@
           <a:p>
             <a:fld id="{AF0F6238-93F0-46F9-A9F1-12C739216386}" type="datetime1">
               <a:rPr lang="en-US" smtClean="0"/>
-              <a:t>2/23/2020</a:t>
+              <a:t>2/29/2020</a:t>
             </a:fld>
             <a:endParaRPr lang="en-US"/>
           </a:p>
@@ -1935,7 +1934,7 @@
           <a:p>
             <a:fld id="{57DFFA17-0D37-468A-97ED-0CE8ECCB5C62}" type="datetime1">
               <a:rPr lang="en-US" smtClean="0"/>
-              <a:t>2/23/2020</a:t>
+              <a:t>2/29/2020</a:t>
             </a:fld>
             <a:endParaRPr lang="en-US"/>
           </a:p>
@@ -2196,7 +2195,7 @@
           <a:p>
             <a:fld id="{69AF0750-A976-4D01-9E35-8E83AA3C2239}" type="datetime1">
               <a:rPr lang="en-US" smtClean="0"/>
-              <a:t>2/23/2020</a:t>
+              <a:t>2/29/2020</a:t>
             </a:fld>
             <a:endParaRPr lang="en-US"/>
           </a:p>
@@ -2620,7 +2619,7 @@
           <a:p>
             <a:fld id="{F1807490-1C3B-4843-BF62-C2A3446743E9}" type="datetime1">
               <a:rPr lang="en-US" smtClean="0"/>
-              <a:t>2/23/2020</a:t>
+              <a:t>2/29/2020</a:t>
             </a:fld>
             <a:endParaRPr lang="en-US"/>
           </a:p>
@@ -3157,7 +3156,7 @@
           <a:p>
             <a:fld id="{4E9D7568-F2D1-467C-AA13-C28159211A52}" type="datetime1">
               <a:rPr lang="en-US" smtClean="0"/>
-              <a:t>2/23/2020</a:t>
+              <a:t>2/29/2020</a:t>
             </a:fld>
             <a:endParaRPr lang="en-US"/>
           </a:p>
@@ -4021,7 +4020,7 @@
           <a:p>
             <a:fld id="{1B2A0430-6486-42E7-957A-EB6391237F24}" type="datetime1">
               <a:rPr lang="en-US" smtClean="0"/>
-              <a:t>2/23/2020</a:t>
+              <a:t>2/29/2020</a:t>
             </a:fld>
             <a:endParaRPr lang="en-US"/>
           </a:p>
@@ -4191,7 +4190,7 @@
           <a:p>
             <a:fld id="{1E9FC8F0-1A9D-44C5-A4F2-0A4C024CC9B2}" type="datetime1">
               <a:rPr lang="en-US" smtClean="0"/>
-              <a:t>2/23/2020</a:t>
+              <a:t>2/29/2020</a:t>
             </a:fld>
             <a:endParaRPr lang="en-US"/>
           </a:p>
@@ -4375,7 +4374,7 @@
           <a:p>
             <a:fld id="{7287105F-ECF0-49CA-892B-FE404268A148}" type="datetime1">
               <a:rPr lang="en-US" smtClean="0"/>
-              <a:t>2/23/2020</a:t>
+              <a:t>2/29/2020</a:t>
             </a:fld>
             <a:endParaRPr lang="en-US"/>
           </a:p>
@@ -4545,7 +4544,7 @@
           <a:p>
             <a:fld id="{B9D6CCE5-8975-4BD9-A422-04FFD9E4B223}" type="datetime1">
               <a:rPr lang="en-US" smtClean="0"/>
-              <a:t>2/23/2020</a:t>
+              <a:t>2/29/2020</a:t>
             </a:fld>
             <a:endParaRPr lang="en-US"/>
           </a:p>
@@ -4789,7 +4788,7 @@
           <a:p>
             <a:fld id="{AFB629E4-8547-4B69-A9EB-114AFD0DB4D5}" type="datetime1">
               <a:rPr lang="en-US" smtClean="0"/>
-              <a:t>2/23/2020</a:t>
+              <a:t>2/29/2020</a:t>
             </a:fld>
             <a:endParaRPr lang="en-US"/>
           </a:p>
@@ -5025,7 +5024,7 @@
           <a:p>
             <a:fld id="{E26CD861-3E9E-4ADC-961C-F154BF327FEF}" type="datetime1">
               <a:rPr lang="en-US" smtClean="0"/>
-              <a:t>2/23/2020</a:t>
+              <a:t>2/29/2020</a:t>
             </a:fld>
             <a:endParaRPr lang="en-US"/>
           </a:p>
@@ -5491,7 +5490,7 @@
           <a:p>
             <a:fld id="{5836DB7E-F7A5-4D31-BFE3-413E7CB92B7E}" type="datetime1">
               <a:rPr lang="en-US" smtClean="0"/>
-              <a:t>2/23/2020</a:t>
+              <a:t>2/29/2020</a:t>
             </a:fld>
             <a:endParaRPr lang="en-US"/>
           </a:p>
@@ -5609,7 +5608,7 @@
           <a:p>
             <a:fld id="{DC4DED38-42F3-42A4-B090-03F2162C448D}" type="datetime1">
               <a:rPr lang="en-US" smtClean="0"/>
-              <a:t>2/23/2020</a:t>
+              <a:t>2/29/2020</a:t>
             </a:fld>
             <a:endParaRPr lang="en-US"/>
           </a:p>
@@ -5704,7 +5703,7 @@
           <a:p>
             <a:fld id="{EF28D758-8D6A-4D72-AC59-BDE178E5FBD5}" type="datetime1">
               <a:rPr lang="en-US" smtClean="0"/>
-              <a:t>2/23/2020</a:t>
+              <a:t>2/29/2020</a:t>
             </a:fld>
             <a:endParaRPr lang="en-US"/>
           </a:p>
@@ -5959,7 +5958,7 @@
           <a:p>
             <a:fld id="{3951C8D1-C70F-43AD-AD9C-7143BA93EEA9}" type="datetime1">
               <a:rPr lang="en-US" smtClean="0"/>
-              <a:t>2/23/2020</a:t>
+              <a:t>2/29/2020</a:t>
             </a:fld>
             <a:endParaRPr lang="en-US"/>
           </a:p>
@@ -6259,7 +6258,7 @@
           <a:p>
             <a:fld id="{346F0265-9720-4166-B262-0A148C9C5C32}" type="datetime1">
               <a:rPr lang="en-US" smtClean="0"/>
-              <a:t>2/23/2020</a:t>
+              <a:t>2/29/2020</a:t>
             </a:fld>
             <a:endParaRPr lang="en-US"/>
           </a:p>
@@ -6545,7 +6544,7 @@
           <a:p>
             <a:fld id="{4B8B7B4A-1005-49D9-B8C0-DBDF77EA94CC}" type="datetime1">
               <a:rPr lang="en-US" smtClean="0"/>
-              <a:t>2/23/2020</a:t>
+              <a:t>2/29/2020</a:t>
             </a:fld>
             <a:endParaRPr lang="en-US"/>
           </a:p>

</xml_diff>